<commit_message>
Add raga to presentation
</commit_message>
<xml_diff>
--- a/Docs/Presentation.pptx
+++ b/Docs/Presentation.pptx
@@ -6021,7 +6021,52 @@
                   <a:srgbClr val="FFFFFF"/>
                 </a:solidFill>
               </a:rPr>
-              <a:t>По какво всеки един клас се различава от останалите?</a:t>
+              <a:t>По какво всеки един клас се различава от останалите</a:t>
+            </a:r>
+            <a:r>
+              <a:rPr lang="bg-BG" i="1" dirty="0" smtClean="0">
+                <a:solidFill>
+                  <a:srgbClr val="FFFFFF"/>
+                </a:solidFill>
+              </a:rPr>
+              <a:t>?</a:t>
+            </a:r>
+            <a:endParaRPr lang="en-US" i="1" dirty="0" smtClean="0">
+              <a:solidFill>
+                <a:srgbClr val="FFFFFF"/>
+              </a:solidFill>
+            </a:endParaRPr>
+          </a:p>
+          <a:p>
+            <a:pPr marL="457200" lvl="0" indent="-381000" algn="l" rtl="0">
+              <a:lnSpc>
+                <a:spcPct val="115000"/>
+              </a:lnSpc>
+              <a:spcBef>
+                <a:spcPts val="0"/>
+              </a:spcBef>
+              <a:buClr>
+                <a:srgbClr val="FFFFFF"/>
+              </a:buClr>
+              <a:buSzPct val="100000"/>
+              <a:buFont typeface="Trebuchet MS"/>
+              <a:buChar char="●"/>
+            </a:pPr>
+            <a:r>
+              <a:rPr lang="en-US" i="1" dirty="0" smtClean="0">
+                <a:solidFill>
+                  <a:srgbClr val="FFFFFF"/>
+                </a:solidFill>
+              </a:rPr>
+              <a:t>Raga (accuracy </a:t>
+            </a:r>
+            <a:r>
+              <a:rPr lang="en-US" i="1" smtClean="0">
+                <a:solidFill>
+                  <a:srgbClr val="FFFFFF"/>
+                </a:solidFill>
+              </a:rPr>
+              <a:t>/ coverage)</a:t>
             </a:r>
             <a:endParaRPr lang="en" i="1" dirty="0">
               <a:solidFill>

</xml_diff>